<commit_message>
Applied Duration class to Flight Class
</commit_message>
<xml_diff>
--- a/Airline Information Management.pptx
+++ b/Airline Information Management.pptx
@@ -5826,21 +5826,6 @@
 </file>
 
 <file path=customXml/item1.xml><?xml version="1.0" encoding="utf-8"?>
-<p:properties xmlns:p="http://schemas.microsoft.com/office/2006/metadata/properties" xmlns:xsi="http://www.w3.org/2001/XMLSchema-instance" xmlns:pc="http://schemas.microsoft.com/office/infopath/2007/PartnerControls">
-  <documentManagement/>
-</p:properties>
-</file>
-
-<file path=customXml/item2.xml><?xml version="1.0" encoding="utf-8"?>
-<?mso-contentType ?>
-<FormTemplates xmlns="http://schemas.microsoft.com/sharepoint/v3/contenttype/forms">
-  <Display>DocumentLibraryForm</Display>
-  <Edit>DocumentLibraryForm</Edit>
-  <New>DocumentLibraryForm</New>
-</FormTemplates>
-</file>
-
-<file path=customXml/item3.xml><?xml version="1.0" encoding="utf-8"?>
 <ct:contentTypeSchema xmlns:ct="http://schemas.microsoft.com/office/2006/metadata/contentType" xmlns:ma="http://schemas.microsoft.com/office/2006/metadata/properties/metaAttributes" ct:_="" ma:_="" ma:contentTypeName="Documento" ma:contentTypeID="0x01010014BC32AFF3718747B5A2CE47A88F3C6A" ma:contentTypeVersion="2" ma:contentTypeDescription="Criar um novo documento." ma:contentTypeScope="" ma:versionID="fee3d826901bcb9451dce0bbc19dadc3">
   <xsd:schema xmlns:xsd="http://www.w3.org/2001/XMLSchema" xmlns:xs="http://www.w3.org/2001/XMLSchema" xmlns:p="http://schemas.microsoft.com/office/2006/metadata/properties" xmlns:ns3="a47fcd35-67e3-4b66-9352-8d0db098ec50" targetNamespace="http://schemas.microsoft.com/office/2006/metadata/properties" ma:root="true" ma:fieldsID="deb6b73c7f47f6e6612a6af669b62c39" ns3:_="">
     <xsd:import namespace="a47fcd35-67e3-4b66-9352-8d0db098ec50"/>
@@ -5972,31 +5957,22 @@
 </ct:contentTypeSchema>
 </file>
 
-<file path=customXml/itemProps1.xml><?xml version="1.0" encoding="utf-8"?>
-<ds:datastoreItem xmlns:ds="http://schemas.openxmlformats.org/officeDocument/2006/customXml" ds:itemID="{05E380B0-3793-4519-A034-114F335A5299}">
-  <ds:schemaRefs>
-    <ds:schemaRef ds:uri="http://purl.org/dc/dcmitype/"/>
-    <ds:schemaRef ds:uri="http://purl.org/dc/terms/"/>
-    <ds:schemaRef ds:uri="http://schemas.microsoft.com/office/2006/metadata/properties"/>
-    <ds:schemaRef ds:uri="http://schemas.microsoft.com/office/2006/documentManagement/types"/>
-    <ds:schemaRef ds:uri="a47fcd35-67e3-4b66-9352-8d0db098ec50"/>
-    <ds:schemaRef ds:uri="http://schemas.openxmlformats.org/package/2006/metadata/core-properties"/>
-    <ds:schemaRef ds:uri="http://purl.org/dc/elements/1.1/"/>
-    <ds:schemaRef ds:uri="http://schemas.microsoft.com/office/infopath/2007/PartnerControls"/>
-    <ds:schemaRef ds:uri="http://www.w3.org/XML/1998/namespace"/>
-  </ds:schemaRefs>
-</ds:datastoreItem>
+<file path=customXml/item2.xml><?xml version="1.0" encoding="utf-8"?>
+<?mso-contentType ?>
+<FormTemplates xmlns="http://schemas.microsoft.com/sharepoint/v3/contenttype/forms">
+  <Display>DocumentLibraryForm</Display>
+  <Edit>DocumentLibraryForm</Edit>
+  <New>DocumentLibraryForm</New>
+</FormTemplates>
 </file>
 
-<file path=customXml/itemProps2.xml><?xml version="1.0" encoding="utf-8"?>
-<ds:datastoreItem xmlns:ds="http://schemas.openxmlformats.org/officeDocument/2006/customXml" ds:itemID="{76EE102A-C587-47D4-980D-6EF803504572}">
-  <ds:schemaRefs>
-    <ds:schemaRef ds:uri="http://schemas.microsoft.com/sharepoint/v3/contenttype/forms"/>
-  </ds:schemaRefs>
-</ds:datastoreItem>
+<file path=customXml/item3.xml><?xml version="1.0" encoding="utf-8"?>
+<p:properties xmlns:p="http://schemas.microsoft.com/office/2006/metadata/properties" xmlns:xsi="http://www.w3.org/2001/XMLSchema-instance" xmlns:pc="http://schemas.microsoft.com/office/infopath/2007/PartnerControls">
+  <documentManagement/>
+</p:properties>
 </file>
 
-<file path=customXml/itemProps3.xml><?xml version="1.0" encoding="utf-8"?>
+<file path=customXml/itemProps1.xml><?xml version="1.0" encoding="utf-8"?>
 <ds:datastoreItem xmlns:ds="http://schemas.openxmlformats.org/officeDocument/2006/customXml" ds:itemID="{9697E427-2E56-4B40-B661-233DAE44C32F}">
   <ds:schemaRefs>
     <ds:schemaRef ds:uri="http://schemas.microsoft.com/office/2006/metadata/contentType"/>
@@ -6012,4 +5988,28 @@
     <ds:schemaRef ds:uri="http://schemas.microsoft.com/internal/obd"/>
   </ds:schemaRefs>
 </ds:datastoreItem>
+</file>
+
+<file path=customXml/itemProps2.xml><?xml version="1.0" encoding="utf-8"?>
+<ds:datastoreItem xmlns:ds="http://schemas.openxmlformats.org/officeDocument/2006/customXml" ds:itemID="{76EE102A-C587-47D4-980D-6EF803504572}">
+  <ds:schemaRefs>
+    <ds:schemaRef ds:uri="http://schemas.microsoft.com/sharepoint/v3/contenttype/forms"/>
+  </ds:schemaRefs>
+</ds:datastoreItem>
+</file>
+
+<file path=customXml/itemProps3.xml><?xml version="1.0" encoding="utf-8"?>
+<ds:datastoreItem xmlns:ds="http://schemas.openxmlformats.org/officeDocument/2006/customXml" ds:itemID="{05E380B0-3793-4519-A034-114F335A5299}">
+  <ds:schemaRefs>
+    <ds:schemaRef ds:uri="http://purl.org/dc/dcmitype/"/>
+    <ds:schemaRef ds:uri="http://purl.org/dc/terms/"/>
+    <ds:schemaRef ds:uri="http://schemas.microsoft.com/office/2006/metadata/properties"/>
+    <ds:schemaRef ds:uri="http://schemas.microsoft.com/office/2006/documentManagement/types"/>
+    <ds:schemaRef ds:uri="a47fcd35-67e3-4b66-9352-8d0db098ec50"/>
+    <ds:schemaRef ds:uri="http://schemas.openxmlformats.org/package/2006/metadata/core-properties"/>
+    <ds:schemaRef ds:uri="http://purl.org/dc/elements/1.1/"/>
+    <ds:schemaRef ds:uri="http://schemas.microsoft.com/office/infopath/2007/PartnerControls"/>
+    <ds:schemaRef ds:uri="http://www.w3.org/XML/1998/namespace"/>
+  </ds:schemaRefs>
+</ds:datastoreItem>
 </file>
</xml_diff>